<commit_message>
Added alloc. to samplePPT
</commit_message>
<xml_diff>
--- a/SamplePPT.pptx
+++ b/SamplePPT.pptx
@@ -12,6 +12,7 @@
     <p:sldId id="260" r:id="rId6"/>
     <p:sldId id="261" r:id="rId7"/>
     <p:sldId id="262" r:id="rId8"/>
+    <p:sldId id="263" r:id="rId9"/>
   </p:sldIdLst>
   <p:sldSz cx="9144000" cy="6858000" type="screen4x3"/>
   <p:notesSz cx="6858000" cy="9144000"/>
@@ -167,10 +168,9 @@
           <a:lstStyle/>
           <a:p>
             <a:r>
-              <a:rPr lang="en-US" smtClean="0"/>
+              <a:rPr lang="en-US"/>
               <a:t>Click to edit Master title style</a:t>
             </a:r>
-            <a:endParaRPr lang="en-US"/>
           </a:p>
         </p:txBody>
       </p:sp>
@@ -286,10 +286,9 @@
           </a:lstStyle>
           <a:p>
             <a:r>
-              <a:rPr lang="en-US" smtClean="0"/>
+              <a:rPr lang="en-US"/>
               <a:t>Click to edit Master subtitle style</a:t>
             </a:r>
-            <a:endParaRPr lang="en-US"/>
           </a:p>
         </p:txBody>
       </p:sp>
@@ -310,7 +309,7 @@
           <a:p>
             <a:fld id="{241EB5C9-1307-BA42-ABA2-0BC069CD8E7F}" type="datetimeFigureOut">
               <a:rPr lang="en-US" smtClean="0"/>
-              <a:t>4/5/2019</a:t>
+              <a:t>11/18/20</a:t>
             </a:fld>
             <a:endParaRPr lang="en-US"/>
           </a:p>
@@ -404,10 +403,9 @@
           <a:lstStyle/>
           <a:p>
             <a:r>
-              <a:rPr lang="en-US" smtClean="0"/>
+              <a:rPr lang="en-US"/>
               <a:t>Click to edit Master title style</a:t>
             </a:r>
-            <a:endParaRPr lang="en-US"/>
           </a:p>
         </p:txBody>
       </p:sp>
@@ -428,38 +426,37 @@
           <a:p>
             <a:pPr lvl="0"/>
             <a:r>
-              <a:rPr lang="en-US" smtClean="0"/>
+              <a:rPr lang="en-US"/>
               <a:t>Click to edit Master text styles</a:t>
             </a:r>
           </a:p>
           <a:p>
             <a:pPr lvl="1"/>
             <a:r>
-              <a:rPr lang="en-US" smtClean="0"/>
+              <a:rPr lang="en-US"/>
               <a:t>Second level</a:t>
             </a:r>
           </a:p>
           <a:p>
             <a:pPr lvl="2"/>
             <a:r>
-              <a:rPr lang="en-US" smtClean="0"/>
+              <a:rPr lang="en-US"/>
               <a:t>Third level</a:t>
             </a:r>
           </a:p>
           <a:p>
             <a:pPr lvl="3"/>
             <a:r>
-              <a:rPr lang="en-US" smtClean="0"/>
+              <a:rPr lang="en-US"/>
               <a:t>Fourth level</a:t>
             </a:r>
           </a:p>
           <a:p>
             <a:pPr lvl="4"/>
             <a:r>
-              <a:rPr lang="en-US" smtClean="0"/>
+              <a:rPr lang="en-US"/>
               <a:t>Fifth level</a:t>
             </a:r>
-            <a:endParaRPr lang="en-US"/>
           </a:p>
         </p:txBody>
       </p:sp>
@@ -480,7 +477,7 @@
           <a:p>
             <a:fld id="{241EB5C9-1307-BA42-ABA2-0BC069CD8E7F}" type="datetimeFigureOut">
               <a:rPr lang="en-US" smtClean="0"/>
-              <a:t>4/5/2019</a:t>
+              <a:t>11/18/20</a:t>
             </a:fld>
             <a:endParaRPr lang="en-US"/>
           </a:p>
@@ -579,10 +576,9 @@
           <a:lstStyle/>
           <a:p>
             <a:r>
-              <a:rPr lang="en-US" smtClean="0"/>
+              <a:rPr lang="en-US"/>
               <a:t>Click to edit Master title style</a:t>
             </a:r>
-            <a:endParaRPr lang="en-US"/>
           </a:p>
         </p:txBody>
       </p:sp>
@@ -608,38 +604,37 @@
           <a:p>
             <a:pPr lvl="0"/>
             <a:r>
-              <a:rPr lang="en-US" smtClean="0"/>
+              <a:rPr lang="en-US"/>
               <a:t>Click to edit Master text styles</a:t>
             </a:r>
           </a:p>
           <a:p>
             <a:pPr lvl="1"/>
             <a:r>
-              <a:rPr lang="en-US" smtClean="0"/>
+              <a:rPr lang="en-US"/>
               <a:t>Second level</a:t>
             </a:r>
           </a:p>
           <a:p>
             <a:pPr lvl="2"/>
             <a:r>
-              <a:rPr lang="en-US" smtClean="0"/>
+              <a:rPr lang="en-US"/>
               <a:t>Third level</a:t>
             </a:r>
           </a:p>
           <a:p>
             <a:pPr lvl="3"/>
             <a:r>
-              <a:rPr lang="en-US" smtClean="0"/>
+              <a:rPr lang="en-US"/>
               <a:t>Fourth level</a:t>
             </a:r>
           </a:p>
           <a:p>
             <a:pPr lvl="4"/>
             <a:r>
-              <a:rPr lang="en-US" smtClean="0"/>
+              <a:rPr lang="en-US"/>
               <a:t>Fifth level</a:t>
             </a:r>
-            <a:endParaRPr lang="en-US"/>
           </a:p>
         </p:txBody>
       </p:sp>
@@ -660,7 +655,7 @@
           <a:p>
             <a:fld id="{241EB5C9-1307-BA42-ABA2-0BC069CD8E7F}" type="datetimeFigureOut">
               <a:rPr lang="en-US" smtClean="0"/>
-              <a:t>4/5/2019</a:t>
+              <a:t>11/18/20</a:t>
             </a:fld>
             <a:endParaRPr lang="en-US"/>
           </a:p>
@@ -754,10 +749,9 @@
           <a:lstStyle/>
           <a:p>
             <a:r>
-              <a:rPr lang="en-US" smtClean="0"/>
+              <a:rPr lang="en-US"/>
               <a:t>Click to edit Master title style</a:t>
             </a:r>
-            <a:endParaRPr lang="en-US"/>
           </a:p>
         </p:txBody>
       </p:sp>
@@ -778,38 +772,37 @@
           <a:p>
             <a:pPr lvl="0"/>
             <a:r>
-              <a:rPr lang="en-US" smtClean="0"/>
+              <a:rPr lang="en-US"/>
               <a:t>Click to edit Master text styles</a:t>
             </a:r>
           </a:p>
           <a:p>
             <a:pPr lvl="1"/>
             <a:r>
-              <a:rPr lang="en-US" smtClean="0"/>
+              <a:rPr lang="en-US"/>
               <a:t>Second level</a:t>
             </a:r>
           </a:p>
           <a:p>
             <a:pPr lvl="2"/>
             <a:r>
-              <a:rPr lang="en-US" smtClean="0"/>
+              <a:rPr lang="en-US"/>
               <a:t>Third level</a:t>
             </a:r>
           </a:p>
           <a:p>
             <a:pPr lvl="3"/>
             <a:r>
-              <a:rPr lang="en-US" smtClean="0"/>
+              <a:rPr lang="en-US"/>
               <a:t>Fourth level</a:t>
             </a:r>
           </a:p>
           <a:p>
             <a:pPr lvl="4"/>
             <a:r>
-              <a:rPr lang="en-US" smtClean="0"/>
+              <a:rPr lang="en-US"/>
               <a:t>Fifth level</a:t>
             </a:r>
-            <a:endParaRPr lang="en-US"/>
           </a:p>
         </p:txBody>
       </p:sp>
@@ -830,7 +823,7 @@
           <a:p>
             <a:fld id="{241EB5C9-1307-BA42-ABA2-0BC069CD8E7F}" type="datetimeFigureOut">
               <a:rPr lang="en-US" smtClean="0"/>
-              <a:t>4/5/2019</a:t>
+              <a:t>11/18/20</a:t>
             </a:fld>
             <a:endParaRPr lang="en-US"/>
           </a:p>
@@ -933,10 +926,9 @@
           </a:lstStyle>
           <a:p>
             <a:r>
-              <a:rPr lang="en-US" smtClean="0"/>
+              <a:rPr lang="en-US"/>
               <a:t>Click to edit Master title style</a:t>
             </a:r>
-            <a:endParaRPr lang="en-US"/>
           </a:p>
         </p:txBody>
       </p:sp>
@@ -1053,7 +1045,7 @@
           <a:p>
             <a:pPr lvl="0"/>
             <a:r>
-              <a:rPr lang="en-US" smtClean="0"/>
+              <a:rPr lang="en-US"/>
               <a:t>Click to edit Master text styles</a:t>
             </a:r>
           </a:p>
@@ -1076,7 +1068,7 @@
           <a:p>
             <a:fld id="{241EB5C9-1307-BA42-ABA2-0BC069CD8E7F}" type="datetimeFigureOut">
               <a:rPr lang="en-US" smtClean="0"/>
-              <a:t>4/5/2019</a:t>
+              <a:t>11/18/20</a:t>
             </a:fld>
             <a:endParaRPr lang="en-US"/>
           </a:p>
@@ -1170,10 +1162,9 @@
           <a:lstStyle/>
           <a:p>
             <a:r>
-              <a:rPr lang="en-US" smtClean="0"/>
+              <a:rPr lang="en-US"/>
               <a:t>Click to edit Master title style</a:t>
             </a:r>
-            <a:endParaRPr lang="en-US"/>
           </a:p>
         </p:txBody>
       </p:sp>
@@ -1227,38 +1218,37 @@
           <a:p>
             <a:pPr lvl="0"/>
             <a:r>
-              <a:rPr lang="en-US" smtClean="0"/>
+              <a:rPr lang="en-US"/>
               <a:t>Click to edit Master text styles</a:t>
             </a:r>
           </a:p>
           <a:p>
             <a:pPr lvl="1"/>
             <a:r>
-              <a:rPr lang="en-US" smtClean="0"/>
+              <a:rPr lang="en-US"/>
               <a:t>Second level</a:t>
             </a:r>
           </a:p>
           <a:p>
             <a:pPr lvl="2"/>
             <a:r>
-              <a:rPr lang="en-US" smtClean="0"/>
+              <a:rPr lang="en-US"/>
               <a:t>Third level</a:t>
             </a:r>
           </a:p>
           <a:p>
             <a:pPr lvl="3"/>
             <a:r>
-              <a:rPr lang="en-US" smtClean="0"/>
+              <a:rPr lang="en-US"/>
               <a:t>Fourth level</a:t>
             </a:r>
           </a:p>
           <a:p>
             <a:pPr lvl="4"/>
             <a:r>
-              <a:rPr lang="en-US" smtClean="0"/>
+              <a:rPr lang="en-US"/>
               <a:t>Fifth level</a:t>
             </a:r>
-            <a:endParaRPr lang="en-US"/>
           </a:p>
         </p:txBody>
       </p:sp>
@@ -1312,38 +1302,37 @@
           <a:p>
             <a:pPr lvl="0"/>
             <a:r>
-              <a:rPr lang="en-US" smtClean="0"/>
+              <a:rPr lang="en-US"/>
               <a:t>Click to edit Master text styles</a:t>
             </a:r>
           </a:p>
           <a:p>
             <a:pPr lvl="1"/>
             <a:r>
-              <a:rPr lang="en-US" smtClean="0"/>
+              <a:rPr lang="en-US"/>
               <a:t>Second level</a:t>
             </a:r>
           </a:p>
           <a:p>
             <a:pPr lvl="2"/>
             <a:r>
-              <a:rPr lang="en-US" smtClean="0"/>
+              <a:rPr lang="en-US"/>
               <a:t>Third level</a:t>
             </a:r>
           </a:p>
           <a:p>
             <a:pPr lvl="3"/>
             <a:r>
-              <a:rPr lang="en-US" smtClean="0"/>
+              <a:rPr lang="en-US"/>
               <a:t>Fourth level</a:t>
             </a:r>
           </a:p>
           <a:p>
             <a:pPr lvl="4"/>
             <a:r>
-              <a:rPr lang="en-US" smtClean="0"/>
+              <a:rPr lang="en-US"/>
               <a:t>Fifth level</a:t>
             </a:r>
-            <a:endParaRPr lang="en-US"/>
           </a:p>
         </p:txBody>
       </p:sp>
@@ -1364,7 +1353,7 @@
           <a:p>
             <a:fld id="{241EB5C9-1307-BA42-ABA2-0BC069CD8E7F}" type="datetimeFigureOut">
               <a:rPr lang="en-US" smtClean="0"/>
-              <a:t>4/5/2019</a:t>
+              <a:t>11/18/20</a:t>
             </a:fld>
             <a:endParaRPr lang="en-US"/>
           </a:p>
@@ -1462,10 +1451,9 @@
           </a:lstStyle>
           <a:p>
             <a:r>
-              <a:rPr lang="en-US" smtClean="0"/>
+              <a:rPr lang="en-US"/>
               <a:t>Click to edit Master title style</a:t>
             </a:r>
-            <a:endParaRPr lang="en-US"/>
           </a:p>
         </p:txBody>
       </p:sp>
@@ -1528,7 +1516,7 @@
           <a:p>
             <a:pPr lvl="0"/>
             <a:r>
-              <a:rPr lang="en-US" smtClean="0"/>
+              <a:rPr lang="en-US"/>
               <a:t>Click to edit Master text styles</a:t>
             </a:r>
           </a:p>
@@ -1584,38 +1572,37 @@
           <a:p>
             <a:pPr lvl="0"/>
             <a:r>
-              <a:rPr lang="en-US" smtClean="0"/>
+              <a:rPr lang="en-US"/>
               <a:t>Click to edit Master text styles</a:t>
             </a:r>
           </a:p>
           <a:p>
             <a:pPr lvl="1"/>
             <a:r>
-              <a:rPr lang="en-US" smtClean="0"/>
+              <a:rPr lang="en-US"/>
               <a:t>Second level</a:t>
             </a:r>
           </a:p>
           <a:p>
             <a:pPr lvl="2"/>
             <a:r>
-              <a:rPr lang="en-US" smtClean="0"/>
+              <a:rPr lang="en-US"/>
               <a:t>Third level</a:t>
             </a:r>
           </a:p>
           <a:p>
             <a:pPr lvl="3"/>
             <a:r>
-              <a:rPr lang="en-US" smtClean="0"/>
+              <a:rPr lang="en-US"/>
               <a:t>Fourth level</a:t>
             </a:r>
           </a:p>
           <a:p>
             <a:pPr lvl="4"/>
             <a:r>
-              <a:rPr lang="en-US" smtClean="0"/>
+              <a:rPr lang="en-US"/>
               <a:t>Fifth level</a:t>
             </a:r>
-            <a:endParaRPr lang="en-US"/>
           </a:p>
         </p:txBody>
       </p:sp>
@@ -1678,7 +1665,7 @@
           <a:p>
             <a:pPr lvl="0"/>
             <a:r>
-              <a:rPr lang="en-US" smtClean="0"/>
+              <a:rPr lang="en-US"/>
               <a:t>Click to edit Master text styles</a:t>
             </a:r>
           </a:p>
@@ -1734,38 +1721,37 @@
           <a:p>
             <a:pPr lvl="0"/>
             <a:r>
-              <a:rPr lang="en-US" smtClean="0"/>
+              <a:rPr lang="en-US"/>
               <a:t>Click to edit Master text styles</a:t>
             </a:r>
           </a:p>
           <a:p>
             <a:pPr lvl="1"/>
             <a:r>
-              <a:rPr lang="en-US" smtClean="0"/>
+              <a:rPr lang="en-US"/>
               <a:t>Second level</a:t>
             </a:r>
           </a:p>
           <a:p>
             <a:pPr lvl="2"/>
             <a:r>
-              <a:rPr lang="en-US" smtClean="0"/>
+              <a:rPr lang="en-US"/>
               <a:t>Third level</a:t>
             </a:r>
           </a:p>
           <a:p>
             <a:pPr lvl="3"/>
             <a:r>
-              <a:rPr lang="en-US" smtClean="0"/>
+              <a:rPr lang="en-US"/>
               <a:t>Fourth level</a:t>
             </a:r>
           </a:p>
           <a:p>
             <a:pPr lvl="4"/>
             <a:r>
-              <a:rPr lang="en-US" smtClean="0"/>
+              <a:rPr lang="en-US"/>
               <a:t>Fifth level</a:t>
             </a:r>
-            <a:endParaRPr lang="en-US"/>
           </a:p>
         </p:txBody>
       </p:sp>
@@ -1786,7 +1772,7 @@
           <a:p>
             <a:fld id="{241EB5C9-1307-BA42-ABA2-0BC069CD8E7F}" type="datetimeFigureOut">
               <a:rPr lang="en-US" smtClean="0"/>
-              <a:t>4/5/2019</a:t>
+              <a:t>11/18/20</a:t>
             </a:fld>
             <a:endParaRPr lang="en-US"/>
           </a:p>
@@ -1880,10 +1866,9 @@
           <a:lstStyle/>
           <a:p>
             <a:r>
-              <a:rPr lang="en-US" smtClean="0"/>
+              <a:rPr lang="en-US"/>
               <a:t>Click to edit Master title style</a:t>
             </a:r>
-            <a:endParaRPr lang="en-US"/>
           </a:p>
         </p:txBody>
       </p:sp>
@@ -1904,7 +1889,7 @@
           <a:p>
             <a:fld id="{241EB5C9-1307-BA42-ABA2-0BC069CD8E7F}" type="datetimeFigureOut">
               <a:rPr lang="en-US" smtClean="0"/>
-              <a:t>4/5/2019</a:t>
+              <a:t>11/18/20</a:t>
             </a:fld>
             <a:endParaRPr lang="en-US"/>
           </a:p>
@@ -1999,7 +1984,7 @@
           <a:p>
             <a:fld id="{241EB5C9-1307-BA42-ABA2-0BC069CD8E7F}" type="datetimeFigureOut">
               <a:rPr lang="en-US" smtClean="0"/>
-              <a:t>4/5/2019</a:t>
+              <a:t>11/18/20</a:t>
             </a:fld>
             <a:endParaRPr lang="en-US"/>
           </a:p>
@@ -2102,10 +2087,9 @@
           </a:lstStyle>
           <a:p>
             <a:r>
-              <a:rPr lang="en-US" smtClean="0"/>
+              <a:rPr lang="en-US"/>
               <a:t>Click to edit Master title style</a:t>
             </a:r>
-            <a:endParaRPr lang="en-US"/>
           </a:p>
         </p:txBody>
       </p:sp>
@@ -2159,38 +2143,37 @@
           <a:p>
             <a:pPr lvl="0"/>
             <a:r>
-              <a:rPr lang="en-US" smtClean="0"/>
+              <a:rPr lang="en-US"/>
               <a:t>Click to edit Master text styles</a:t>
             </a:r>
           </a:p>
           <a:p>
             <a:pPr lvl="1"/>
             <a:r>
-              <a:rPr lang="en-US" smtClean="0"/>
+              <a:rPr lang="en-US"/>
               <a:t>Second level</a:t>
             </a:r>
           </a:p>
           <a:p>
             <a:pPr lvl="2"/>
             <a:r>
-              <a:rPr lang="en-US" smtClean="0"/>
+              <a:rPr lang="en-US"/>
               <a:t>Third level</a:t>
             </a:r>
           </a:p>
           <a:p>
             <a:pPr lvl="3"/>
             <a:r>
-              <a:rPr lang="en-US" smtClean="0"/>
+              <a:rPr lang="en-US"/>
               <a:t>Fourth level</a:t>
             </a:r>
           </a:p>
           <a:p>
             <a:pPr lvl="4"/>
             <a:r>
-              <a:rPr lang="en-US" smtClean="0"/>
+              <a:rPr lang="en-US"/>
               <a:t>Fifth level</a:t>
             </a:r>
-            <a:endParaRPr lang="en-US"/>
           </a:p>
         </p:txBody>
       </p:sp>
@@ -2253,7 +2236,7 @@
           <a:p>
             <a:pPr lvl="0"/>
             <a:r>
-              <a:rPr lang="en-US" smtClean="0"/>
+              <a:rPr lang="en-US"/>
               <a:t>Click to edit Master text styles</a:t>
             </a:r>
           </a:p>
@@ -2276,7 +2259,7 @@
           <a:p>
             <a:fld id="{241EB5C9-1307-BA42-ABA2-0BC069CD8E7F}" type="datetimeFigureOut">
               <a:rPr lang="en-US" smtClean="0"/>
-              <a:t>4/5/2019</a:t>
+              <a:t>11/18/20</a:t>
             </a:fld>
             <a:endParaRPr lang="en-US"/>
           </a:p>
@@ -2379,10 +2362,9 @@
           </a:lstStyle>
           <a:p>
             <a:r>
-              <a:rPr lang="en-US" smtClean="0"/>
+              <a:rPr lang="en-US"/>
               <a:t>Click to edit Master title style</a:t>
             </a:r>
-            <a:endParaRPr lang="en-US"/>
           </a:p>
         </p:txBody>
       </p:sp>
@@ -2506,7 +2488,7 @@
           <a:p>
             <a:pPr lvl="0"/>
             <a:r>
-              <a:rPr lang="en-US" smtClean="0"/>
+              <a:rPr lang="en-US"/>
               <a:t>Click to edit Master text styles</a:t>
             </a:r>
           </a:p>
@@ -2529,7 +2511,7 @@
           <a:p>
             <a:fld id="{241EB5C9-1307-BA42-ABA2-0BC069CD8E7F}" type="datetimeFigureOut">
               <a:rPr lang="en-US" smtClean="0"/>
-              <a:t>4/5/2019</a:t>
+              <a:t>11/18/20</a:t>
             </a:fld>
             <a:endParaRPr lang="en-US"/>
           </a:p>
@@ -2638,10 +2620,9 @@
           <a:lstStyle/>
           <a:p>
             <a:r>
-              <a:rPr lang="en-US" smtClean="0"/>
+              <a:rPr lang="en-US"/>
               <a:t>Click to edit Master title style</a:t>
             </a:r>
-            <a:endParaRPr lang="en-US"/>
           </a:p>
         </p:txBody>
       </p:sp>
@@ -2672,38 +2653,37 @@
           <a:p>
             <a:pPr lvl="0"/>
             <a:r>
-              <a:rPr lang="en-US" smtClean="0"/>
+              <a:rPr lang="en-US"/>
               <a:t>Click to edit Master text styles</a:t>
             </a:r>
           </a:p>
           <a:p>
             <a:pPr lvl="1"/>
             <a:r>
-              <a:rPr lang="en-US" smtClean="0"/>
+              <a:rPr lang="en-US"/>
               <a:t>Second level</a:t>
             </a:r>
           </a:p>
           <a:p>
             <a:pPr lvl="2"/>
             <a:r>
-              <a:rPr lang="en-US" smtClean="0"/>
+              <a:rPr lang="en-US"/>
               <a:t>Third level</a:t>
             </a:r>
           </a:p>
           <a:p>
             <a:pPr lvl="3"/>
             <a:r>
-              <a:rPr lang="en-US" smtClean="0"/>
+              <a:rPr lang="en-US"/>
               <a:t>Fourth level</a:t>
             </a:r>
           </a:p>
           <a:p>
             <a:pPr lvl="4"/>
             <a:r>
-              <a:rPr lang="en-US" smtClean="0"/>
+              <a:rPr lang="en-US"/>
               <a:t>Fifth level</a:t>
             </a:r>
-            <a:endParaRPr lang="en-US"/>
           </a:p>
         </p:txBody>
       </p:sp>
@@ -2742,7 +2722,7 @@
           <a:p>
             <a:fld id="{241EB5C9-1307-BA42-ABA2-0BC069CD8E7F}" type="datetimeFigureOut">
               <a:rPr lang="en-US" smtClean="0"/>
-              <a:t>4/5/2019</a:t>
+              <a:t>11/18/20</a:t>
             </a:fld>
             <a:endParaRPr lang="en-US"/>
           </a:p>
@@ -3137,28 +3117,11 @@
           <a:bodyPr/>
           <a:lstStyle/>
           <a:p>
-            <a:pPr lvl="0" marL="0" indent="0">
+            <a:pPr marL="0" lvl="0" indent="0">
               <a:buNone/>
             </a:pPr>
             <a:r>
-              <a:rPr/>
-              <a:t>SamplePPT</a:t>
-            </a:r>
-            <a:r>
-              <a:rPr/>
-              <a:t> </a:t>
-            </a:r>
-            <a:r>
-              <a:rPr/>
-              <a:t>(PERSI</a:t>
-            </a:r>
-            <a:r>
-              <a:rPr/>
-              <a:t> </a:t>
-            </a:r>
-            <a:r>
-              <a:rPr/>
-              <a:t>graphs)</a:t>
+              <a:t>SamplePPT (PERSI graphs)</a:t>
             </a:r>
           </a:p>
         </p:txBody>
@@ -3183,38 +3146,13 @@
           <a:bodyPr/>
           <a:lstStyle/>
           <a:p>
-            <a:pPr lvl="0" marL="0" indent="0">
+            <a:pPr marL="0" lvl="0" indent="0">
               <a:buNone/>
             </a:pPr>
             <a:br/>
             <a:br/>
             <a:r>
-              <a:rPr/>
-              <a:t>Anil,</a:t>
-            </a:r>
-            <a:r>
-              <a:rPr/>
-              <a:t> </a:t>
-            </a:r>
-            <a:r>
-              <a:rPr/>
-              <a:t>Swaroop</a:t>
-            </a:r>
-            <a:r>
-              <a:rPr/>
-              <a:t> </a:t>
-            </a:r>
-            <a:r>
-              <a:rPr/>
-              <a:t>&amp;</a:t>
-            </a:r>
-            <a:r>
-              <a:rPr/>
-              <a:t> </a:t>
-            </a:r>
-            <a:r>
-              <a:rPr/>
-              <a:t>Jen</a:t>
+              <a:t>Anil, Swaroop &amp; Jen</a:t>
             </a:r>
           </a:p>
         </p:txBody>
@@ -3234,11 +3172,10 @@
           <a:bodyPr/>
           <a:lstStyle/>
           <a:p>
-            <a:pPr lvl="0" marL="0" indent="0">
+            <a:pPr marL="0" lvl="0" indent="0">
               <a:buNone/>
             </a:pPr>
             <a:r>
-              <a:rPr/>
               <a:t>11/12/2020</a:t>
             </a:r>
           </a:p>
@@ -3246,6 +3183,9 @@
       </p:sp>
     </p:spTree>
   </p:cSld>
+  <p:clrMapOvr>
+    <a:masterClrMapping/>
+  </p:clrMapOvr>
 </p:sld>
 </file>
 
@@ -3281,83 +3221,18 @@
           <a:bodyPr/>
           <a:lstStyle/>
           <a:p>
-            <a:pPr lvl="0" marL="0" indent="0">
+            <a:pPr marL="0" lvl="0" indent="0">
               <a:buNone/>
             </a:pPr>
             <a:r>
-              <a:rPr/>
-              <a:t>A</a:t>
-            </a:r>
-            <a:r>
-              <a:rPr/>
-              <a:t> </a:t>
-            </a:r>
-            <a:r>
-              <a:rPr/>
-              <a:t>History</a:t>
-            </a:r>
-            <a:r>
-              <a:rPr/>
-              <a:t> </a:t>
-            </a:r>
-            <a:r>
-              <a:rPr/>
-              <a:t>of</a:t>
-            </a:r>
-            <a:r>
-              <a:rPr/>
-              <a:t> </a:t>
-            </a:r>
-            <a:r>
-              <a:rPr/>
-              <a:t>Weakening</a:t>
-            </a:r>
-            <a:r>
-              <a:rPr/>
-              <a:t> </a:t>
-            </a:r>
-            <a:r>
-              <a:rPr/>
-              <a:t>Solvency</a:t>
-            </a:r>
-            <a:r>
-              <a:rPr/>
-              <a:t> </a:t>
-            </a:r>
-            <a:r>
-              <a:rPr/>
-              <a:t>(2001-2019)</a:t>
-            </a:r>
-            <a:r>
-              <a:rPr/>
-              <a:t> </a:t>
-            </a:r>
-            <a:r>
-              <a:rPr/>
-              <a:t>w/</a:t>
-            </a:r>
-            <a:r>
-              <a:rPr/>
-              <a:t> </a:t>
-            </a:r>
-            <a:r>
-              <a:rPr/>
-              <a:t>R</a:t>
-            </a:r>
-            <a:r>
-              <a:rPr/>
-              <a:t> </a:t>
-            </a:r>
-            <a:r>
-              <a:rPr/>
-              <a:t>Code</a:t>
+              <a:t>A History of Weakening Solvency (2001-2019) w/ R Code</a:t>
             </a:r>
           </a:p>
         </p:txBody>
       </p:sp>
       <p:pic>
         <p:nvPicPr>
-          <p:cNvPr descr="SamplePPT_files/figure-pptx/debt-1.png" id="0" name="Picture 1"/>
+          <p:cNvPr id="3" name="Picture 1" descr="SamplePPT_files/figure-pptx/debt-1.png"/>
           <p:cNvPicPr>
             <a:picLocks noGrp="1" noChangeAspect="1"/>
           </p:cNvPicPr>
@@ -3387,6 +3262,9 @@
       </p:pic>
     </p:spTree>
   </p:cSld>
+  <p:clrMapOvr>
+    <a:masterClrMapping/>
+  </p:clrMapOvr>
 </p:sld>
 </file>
 
@@ -3422,83 +3300,18 @@
           <a:bodyPr/>
           <a:lstStyle/>
           <a:p>
-            <a:pPr lvl="0" marL="0" indent="0">
+            <a:pPr marL="0" lvl="0" indent="0">
               <a:buNone/>
             </a:pPr>
             <a:r>
-              <a:rPr/>
-              <a:t>A</a:t>
-            </a:r>
-            <a:r>
-              <a:rPr/>
-              <a:t> </a:t>
-            </a:r>
-            <a:r>
-              <a:rPr/>
-              <a:t>History</a:t>
-            </a:r>
-            <a:r>
-              <a:rPr/>
-              <a:t> </a:t>
-            </a:r>
-            <a:r>
-              <a:rPr/>
-              <a:t>of</a:t>
-            </a:r>
-            <a:r>
-              <a:rPr/>
-              <a:t> </a:t>
-            </a:r>
-            <a:r>
-              <a:rPr/>
-              <a:t>Investment</a:t>
-            </a:r>
-            <a:r>
-              <a:rPr/>
-              <a:t> </a:t>
-            </a:r>
-            <a:r>
-              <a:rPr/>
-              <a:t>Returns</a:t>
-            </a:r>
-            <a:r>
-              <a:rPr/>
-              <a:t> </a:t>
-            </a:r>
-            <a:r>
-              <a:rPr/>
-              <a:t>(2001-2019)</a:t>
-            </a:r>
-            <a:r>
-              <a:rPr/>
-              <a:t> </a:t>
-            </a:r>
-            <a:r>
-              <a:rPr/>
-              <a:t>w/</a:t>
-            </a:r>
-            <a:r>
-              <a:rPr/>
-              <a:t> </a:t>
-            </a:r>
-            <a:r>
-              <a:rPr/>
-              <a:t>R</a:t>
-            </a:r>
-            <a:r>
-              <a:rPr/>
-              <a:t> </a:t>
-            </a:r>
-            <a:r>
-              <a:rPr/>
-              <a:t>Code</a:t>
+              <a:t>A History of Investment Returns (2001-2019) w/ R Code</a:t>
             </a:r>
           </a:p>
         </p:txBody>
       </p:sp>
       <p:pic>
         <p:nvPicPr>
-          <p:cNvPr descr="SamplePPT_files/figure-pptx/graph-1.png" id="0" name="Picture 1"/>
+          <p:cNvPr id="3" name="Picture 1" descr="SamplePPT_files/figure-pptx/graph-1.png"/>
           <p:cNvPicPr>
             <a:picLocks noGrp="1" noChangeAspect="1"/>
           </p:cNvPicPr>
@@ -3528,6 +3341,9 @@
       </p:pic>
     </p:spTree>
   </p:cSld>
+  <p:clrMapOvr>
+    <a:masterClrMapping/>
+  </p:clrMapOvr>
 </p:sld>
 </file>
 
@@ -3563,59 +3379,18 @@
           <a:bodyPr/>
           <a:lstStyle/>
           <a:p>
-            <a:pPr lvl="0" marL="0" indent="0">
+            <a:pPr marL="0" lvl="0" indent="0">
               <a:buNone/>
             </a:pPr>
             <a:r>
-              <a:rPr/>
-              <a:t>Negative</a:t>
-            </a:r>
-            <a:r>
-              <a:rPr/>
-              <a:t> </a:t>
-            </a:r>
-            <a:r>
-              <a:rPr/>
-              <a:t>Amortization</a:t>
-            </a:r>
-            <a:r>
-              <a:rPr/>
-              <a:t> </a:t>
-            </a:r>
-            <a:r>
-              <a:rPr/>
-              <a:t>Growth</a:t>
-            </a:r>
-            <a:r>
-              <a:rPr/>
-              <a:t> </a:t>
-            </a:r>
-            <a:r>
-              <a:rPr/>
-              <a:t>w/</a:t>
-            </a:r>
-            <a:r>
-              <a:rPr/>
-              <a:t> </a:t>
-            </a:r>
-            <a:r>
-              <a:rPr/>
-              <a:t>R</a:t>
-            </a:r>
-            <a:r>
-              <a:rPr/>
-              <a:t> </a:t>
-            </a:r>
-            <a:r>
-              <a:rPr/>
-              <a:t>Code</a:t>
+              <a:t>Asset Allocation w/ R Code</a:t>
             </a:r>
           </a:p>
         </p:txBody>
       </p:sp>
       <p:pic>
         <p:nvPicPr>
-          <p:cNvPr descr="SamplePPT_files/figure-pptx/neg.amo-1.png" id="0" name="Picture 1"/>
+          <p:cNvPr id="3" name="Picture 1" descr="SamplePPT_files/figure-pptx/assets-1.png"/>
           <p:cNvPicPr>
             <a:picLocks noGrp="1" noChangeAspect="1"/>
           </p:cNvPicPr>
@@ -3645,6 +3420,9 @@
       </p:pic>
     </p:spTree>
   </p:cSld>
+  <p:clrMapOvr>
+    <a:masterClrMapping/>
+  </p:clrMapOvr>
 </p:sld>
 </file>
 
@@ -3680,75 +3458,97 @@
           <a:bodyPr/>
           <a:lstStyle/>
           <a:p>
-            <a:pPr lvl="0" marL="0" indent="0">
+            <a:pPr marL="0" lvl="0" indent="0">
               <a:buNone/>
             </a:pPr>
             <a:r>
-              <a:rPr/>
-              <a:t>A</a:t>
-            </a:r>
-            <a:r>
-              <a:rPr/>
-              <a:t> </a:t>
-            </a:r>
-            <a:r>
-              <a:rPr/>
-              <a:t>Mountain</a:t>
-            </a:r>
-            <a:r>
-              <a:rPr/>
-              <a:t> </a:t>
-            </a:r>
-            <a:r>
-              <a:rPr/>
-              <a:t>fo</a:t>
-            </a:r>
-            <a:r>
-              <a:rPr/>
-              <a:t> </a:t>
-            </a:r>
-            <a:r>
-              <a:rPr/>
-              <a:t>Debt</a:t>
-            </a:r>
-            <a:r>
-              <a:rPr/>
-              <a:t> </a:t>
-            </a:r>
-            <a:r>
-              <a:rPr/>
-              <a:t>Plot</a:t>
-            </a:r>
-            <a:r>
-              <a:rPr/>
-              <a:t> </a:t>
-            </a:r>
-            <a:r>
-              <a:rPr/>
-              <a:t>w/</a:t>
-            </a:r>
-            <a:r>
-              <a:rPr/>
-              <a:t> </a:t>
-            </a:r>
-            <a:r>
-              <a:rPr/>
-              <a:t>Saved</a:t>
-            </a:r>
-            <a:r>
-              <a:rPr/>
-              <a:t> </a:t>
-            </a:r>
-            <a:r>
-              <a:rPr/>
-              <a:t>Img</a:t>
+              <a:t>Negative Amortization Growth w/ R Code</a:t>
             </a:r>
           </a:p>
         </p:txBody>
       </p:sp>
       <p:pic>
         <p:nvPicPr>
-          <p:cNvPr descr="PERSI.debptPlot2.jpeg" id="0" name="Picture 1"/>
+          <p:cNvPr id="3" name="Picture 1" descr="SamplePPT_files/figure-pptx/neg.amo-1.png"/>
+          <p:cNvPicPr>
+            <a:picLocks noGrp="1" noChangeAspect="1"/>
+          </p:cNvPicPr>
+          <p:nvPr/>
+        </p:nvPicPr>
+        <p:blipFill>
+          <a:blip r:embed="rId2"/>
+          <a:stretch>
+            <a:fillRect/>
+          </a:stretch>
+        </p:blipFill>
+        <p:spPr bwMode="auto">
+          <a:xfrm>
+            <a:off x="952500" y="1600200"/>
+            <a:ext cx="7239000" cy="4521200"/>
+          </a:xfrm>
+          <a:prstGeom prst="rect">
+            <a:avLst/>
+          </a:prstGeom>
+          <a:noFill/>
+          <a:ln w="9525">
+            <a:noFill/>
+            <a:headEnd/>
+            <a:tailEnd/>
+          </a:ln>
+        </p:spPr>
+      </p:pic>
+    </p:spTree>
+  </p:cSld>
+  <p:clrMapOvr>
+    <a:masterClrMapping/>
+  </p:clrMapOvr>
+</p:sld>
+</file>
+
+<file path=ppt/slides/slide6.xml><?xml version="1.0" encoding="utf-8"?>
+<p:sld xmlns:a="http://schemas.openxmlformats.org/drawingml/2006/main" xmlns:r="http://schemas.openxmlformats.org/officeDocument/2006/relationships" xmlns:p="http://schemas.openxmlformats.org/presentationml/2006/main">
+  <p:cSld>
+    <p:spTree>
+      <p:nvGrpSpPr>
+        <p:cNvPr id="1" name=""/>
+        <p:cNvGrpSpPr/>
+        <p:nvPr/>
+      </p:nvGrpSpPr>
+      <p:grpSpPr>
+        <a:xfrm>
+          <a:off x="0" y="0"/>
+          <a:ext cx="0" cy="0"/>
+          <a:chOff x="0" y="0"/>
+          <a:chExt cx="0" cy="0"/>
+        </a:xfrm>
+      </p:grpSpPr>
+      <p:sp>
+        <p:nvSpPr>
+          <p:cNvPr id="2" name="Title 1"/>
+          <p:cNvSpPr>
+            <a:spLocks noGrp="1"/>
+          </p:cNvSpPr>
+          <p:nvPr>
+            <p:ph type="title"/>
+          </p:nvPr>
+        </p:nvSpPr>
+        <p:spPr/>
+        <p:txBody>
+          <a:bodyPr/>
+          <a:lstStyle/>
+          <a:p>
+            <a:pPr marL="0" lvl="0" indent="0">
+              <a:buNone/>
+            </a:pPr>
+            <a:r>
+              <a:t>A Mountain fo Debt Plot w/ Saved Img</a:t>
+            </a:r>
+          </a:p>
+        </p:txBody>
+      </p:sp>
+      <p:pic>
+        <p:nvPicPr>
+          <p:cNvPr id="3" name="Picture 1" descr="PERSI.debptPlot2.jpeg"/>
           <p:cNvPicPr>
             <a:picLocks noGrp="1" noChangeAspect="1"/>
           </p:cNvPicPr>
@@ -3778,10 +3578,13 @@
       </p:pic>
     </p:spTree>
   </p:cSld>
+  <p:clrMapOvr>
+    <a:masterClrMapping/>
+  </p:clrMapOvr>
 </p:sld>
 </file>
 
-<file path=ppt/slides/slide6.xml><?xml version="1.0" encoding="utf-8"?>
+<file path=ppt/slides/slide7.xml><?xml version="1.0" encoding="utf-8"?>
 <p:sld xmlns:a="http://schemas.openxmlformats.org/drawingml/2006/main" xmlns:r="http://schemas.openxmlformats.org/officeDocument/2006/relationships" xmlns:p="http://schemas.openxmlformats.org/presentationml/2006/main">
   <p:cSld>
     <p:spTree>
@@ -3813,83 +3616,18 @@
           <a:bodyPr/>
           <a:lstStyle/>
           <a:p>
-            <a:pPr lvl="0" marL="0" indent="0">
+            <a:pPr marL="0" lvl="0" indent="0">
               <a:buNone/>
             </a:pPr>
             <a:r>
-              <a:rPr/>
-              <a:t>A</a:t>
-            </a:r>
-            <a:r>
-              <a:rPr/>
-              <a:t> </a:t>
-            </a:r>
-            <a:r>
-              <a:rPr/>
-              <a:t>History</a:t>
-            </a:r>
-            <a:r>
-              <a:rPr/>
-              <a:t> </a:t>
-            </a:r>
-            <a:r>
-              <a:rPr/>
-              <a:t>of</a:t>
-            </a:r>
-            <a:r>
-              <a:rPr/>
-              <a:t> </a:t>
-            </a:r>
-            <a:r>
-              <a:rPr/>
-              <a:t>Weakening</a:t>
-            </a:r>
-            <a:r>
-              <a:rPr/>
-              <a:t> </a:t>
-            </a:r>
-            <a:r>
-              <a:rPr/>
-              <a:t>Solvency</a:t>
-            </a:r>
-            <a:r>
-              <a:rPr/>
-              <a:t> </a:t>
-            </a:r>
-            <a:r>
-              <a:rPr/>
-              <a:t>(2001-2019)</a:t>
-            </a:r>
-            <a:r>
-              <a:rPr/>
-              <a:t> </a:t>
-            </a:r>
-            <a:r>
-              <a:rPr/>
-              <a:t>w/</a:t>
-            </a:r>
-            <a:r>
-              <a:rPr/>
-              <a:t> </a:t>
-            </a:r>
-            <a:r>
-              <a:rPr/>
-              <a:t>Saved</a:t>
-            </a:r>
-            <a:r>
-              <a:rPr/>
-              <a:t> </a:t>
-            </a:r>
-            <a:r>
-              <a:rPr/>
-              <a:t>Img</a:t>
+              <a:t>A History of Weakening Solvency (2001-2019) w/ Saved Img</a:t>
             </a:r>
           </a:p>
         </p:txBody>
       </p:sp>
       <p:pic>
         <p:nvPicPr>
-          <p:cNvPr descr="graphs/Inv.Returns.PERSI.jpeg" id="0" name="Picture 1"/>
+          <p:cNvPr id="3" name="Picture 1" descr="graphs/Inv.Returns.PERSI.jpeg"/>
           <p:cNvPicPr>
             <a:picLocks noGrp="1" noChangeAspect="1"/>
           </p:cNvPicPr>
@@ -3919,10 +3657,13 @@
       </p:pic>
     </p:spTree>
   </p:cSld>
+  <p:clrMapOvr>
+    <a:masterClrMapping/>
+  </p:clrMapOvr>
 </p:sld>
 </file>
 
-<file path=ppt/slides/slide7.xml><?xml version="1.0" encoding="utf-8"?>
+<file path=ppt/slides/slide8.xml><?xml version="1.0" encoding="utf-8"?>
 <p:sld xmlns:a="http://schemas.openxmlformats.org/drawingml/2006/main" xmlns:r="http://schemas.openxmlformats.org/officeDocument/2006/relationships" xmlns:p="http://schemas.openxmlformats.org/presentationml/2006/main">
   <p:cSld>
     <p:spTree>
@@ -3954,11 +3695,10 @@
           <a:bodyPr/>
           <a:lstStyle/>
           <a:p>
-            <a:pPr lvl="0" marL="0" indent="0">
+            <a:pPr marL="0" lvl="0" indent="0">
               <a:buNone/>
             </a:pPr>
             <a:r>
-              <a:rPr/>
               <a:t>References</a:t>
             </a:r>
           </a:p>
@@ -4009,6 +3749,9 @@
       </p:sp>
     </p:spTree>
   </p:cSld>
+  <p:clrMapOvr>
+    <a:masterClrMapping/>
+  </p:clrMapOvr>
 </p:sld>
 </file>
 

</xml_diff>